<commit_message>
Revert "Revert "delete commentaries""
This reverts commit 82afc236adde521af42bf3a70bf82540699e91bc.
</commit_message>
<xml_diff>
--- a/commun/Réunion 10/PPDiFalcoHuygebaert.pptx
+++ b/commun/Réunion 10/PPDiFalcoHuygebaert.pptx
@@ -14646,13 +14646,8 @@
             </a:r>
             <a:r>
               <a:rPr lang="fr-BE" dirty="0"/>
-              <a:t> : 1 / 2 of </a:t>
-            </a:r>
-            <a:r>
-              <a:rPr lang="fr-BE" dirty="0" err="1"/>
-              <a:t>own</a:t>
-            </a:r>
-            <a:endParaRPr lang="fr-BE" dirty="0"/>
+              <a:t> : 1 / 2</a:t>
+            </a:r>
           </a:p>
         </p:txBody>
       </p:sp>
@@ -14819,13 +14814,8 @@
             </a:r>
             <a:r>
               <a:rPr lang="fr-BE" dirty="0"/>
-              <a:t> : 2 / 2 of </a:t>
-            </a:r>
-            <a:r>
-              <a:rPr lang="fr-BE" dirty="0" err="1"/>
-              <a:t>own</a:t>
-            </a:r>
-            <a:endParaRPr lang="fr-BE" dirty="0"/>
+              <a:t> : 2 / 2</a:t>
+            </a:r>
           </a:p>
         </p:txBody>
       </p:sp>

</xml_diff>